<commit_message>
Added lecture 11 on data privacy
</commit_message>
<xml_diff>
--- a/2021fa_cs361s/slides/10_web_threats.pptx
+++ b/2021fa_cs361s/slides/10_web_threats.pptx
@@ -31,18 +31,6 @@
     <p:sldId id="289" r:id="rId25"/>
     <p:sldId id="290" r:id="rId26"/>
     <p:sldId id="291" r:id="rId27"/>
-    <p:sldId id="278" r:id="rId28"/>
-    <p:sldId id="279" r:id="rId29"/>
-    <p:sldId id="280" r:id="rId30"/>
-    <p:sldId id="281" r:id="rId31"/>
-    <p:sldId id="282" r:id="rId32"/>
-    <p:sldId id="283" r:id="rId33"/>
-    <p:sldId id="284" r:id="rId34"/>
-    <p:sldId id="285" r:id="rId35"/>
-    <p:sldId id="286" r:id="rId36"/>
-    <p:sldId id="287" r:id="rId37"/>
-    <p:sldId id="292" r:id="rId38"/>
-    <p:sldId id="293" r:id="rId39"/>
   </p:sldIdLst>
   <p:sldSz cx="9144000" cy="6858000" type="screen4x3"/>
   <p:notesSz cx="6858000" cy="9144000"/>
@@ -6517,12 +6505,8 @@
           </a:p>
           <a:p>
             <a:r>
-              <a:rPr lang="en-US" b="1"/>
-              <a:t>Fall </a:t>
-            </a:r>
-            <a:r>
               <a:rPr lang="en-US" b="1" dirty="0"/>
-              <a:t>2021</a:t>
+              <a:t>Fall 2021</a:t>
             </a:r>
           </a:p>
           <a:p>
@@ -13415,364 +13399,6 @@
 </p:sld>
 </file>
 
-<file path=ppt/slides/slide27.xml><?xml version="1.0" encoding="utf-8"?>
-<p:sld xmlns:a="http://schemas.openxmlformats.org/drawingml/2006/main" xmlns:r="http://schemas.openxmlformats.org/officeDocument/2006/relationships" xmlns:p="http://schemas.openxmlformats.org/presentationml/2006/main">
-  <p:cSld>
-    <p:spTree>
-      <p:nvGrpSpPr>
-        <p:cNvPr id="1" name=""/>
-        <p:cNvGrpSpPr/>
-        <p:nvPr/>
-      </p:nvGrpSpPr>
-      <p:grpSpPr>
-        <a:xfrm>
-          <a:off x="0" y="0"/>
-          <a:ext cx="0" cy="0"/>
-          <a:chOff x="0" y="0"/>
-          <a:chExt cx="0" cy="0"/>
-        </a:xfrm>
-      </p:grpSpPr>
-      <p:sp>
-        <p:nvSpPr>
-          <p:cNvPr id="2" name="Title 1">
-            <a:extLst>
-              <a:ext uri="{FF2B5EF4-FFF2-40B4-BE49-F238E27FC236}">
-                <a16:creationId xmlns:a16="http://schemas.microsoft.com/office/drawing/2014/main" id="{1C7E002E-8AAD-4B7D-ACC1-1FF5AA980F66}"/>
-              </a:ext>
-            </a:extLst>
-          </p:cNvPr>
-          <p:cNvSpPr>
-            <a:spLocks noGrp="1"/>
-          </p:cNvSpPr>
-          <p:nvPr>
-            <p:ph type="title"/>
-          </p:nvPr>
-        </p:nvSpPr>
-        <p:spPr/>
-        <p:txBody>
-          <a:bodyPr/>
-          <a:lstStyle/>
-          <a:p>
-            <a:r>
-              <a:rPr lang="en-US" dirty="0"/>
-              <a:t>Browsers Can Also Be Bad!</a:t>
-            </a:r>
-          </a:p>
-        </p:txBody>
-      </p:sp>
-      <p:sp>
-        <p:nvSpPr>
-          <p:cNvPr id="3" name="Content Placeholder 2">
-            <a:extLst>
-              <a:ext uri="{FF2B5EF4-FFF2-40B4-BE49-F238E27FC236}">
-                <a16:creationId xmlns:a16="http://schemas.microsoft.com/office/drawing/2014/main" id="{B620BCE9-9E36-4CF3-95CA-AE687EAC6A3B}"/>
-              </a:ext>
-            </a:extLst>
-          </p:cNvPr>
-          <p:cNvSpPr>
-            <a:spLocks noGrp="1"/>
-          </p:cNvSpPr>
-          <p:nvPr>
-            <p:ph sz="quarter" idx="13"/>
-          </p:nvPr>
-        </p:nvSpPr>
-        <p:spPr>
-          <a:xfrm>
-            <a:off x="609600" y="1828800"/>
-            <a:ext cx="7924800" cy="3886200"/>
-          </a:xfrm>
-        </p:spPr>
-        <p:txBody>
-          <a:bodyPr>
-            <a:normAutofit/>
-          </a:bodyPr>
-          <a:lstStyle/>
-          <a:p>
-            <a:r>
-              <a:rPr lang="en-US" sz="2400" dirty="0"/>
-              <a:t>“Man-in-the-Browser” Attack</a:t>
-            </a:r>
-          </a:p>
-          <a:p>
-            <a:r>
-              <a:rPr lang="en-US" sz="2400" dirty="0"/>
-              <a:t>The Browser is the “other end” of end-to-end</a:t>
-            </a:r>
-          </a:p>
-          <a:p>
-            <a:r>
-              <a:rPr lang="en-US" sz="2400" dirty="0"/>
-              <a:t>The Browser sees all the unencrypted data</a:t>
-            </a:r>
-          </a:p>
-          <a:p>
-            <a:r>
-              <a:rPr lang="en-US" sz="2400" dirty="0"/>
-              <a:t>If the Browser is evil, all data compromised</a:t>
-            </a:r>
-          </a:p>
-          <a:p>
-            <a:r>
-              <a:rPr lang="en-US" sz="2400" dirty="0"/>
-              <a:t>For example, if corrupted by malware</a:t>
-            </a:r>
-          </a:p>
-        </p:txBody>
-      </p:sp>
-    </p:spTree>
-    <p:extLst>
-      <p:ext uri="{BB962C8B-B14F-4D97-AF65-F5344CB8AC3E}">
-        <p14:creationId xmlns:p14="http://schemas.microsoft.com/office/powerpoint/2010/main" val="1835216954"/>
-      </p:ext>
-    </p:extLst>
-  </p:cSld>
-  <p:clrMapOvr>
-    <a:masterClrMapping/>
-  </p:clrMapOvr>
-</p:sld>
-</file>
-
-<file path=ppt/slides/slide28.xml><?xml version="1.0" encoding="utf-8"?>
-<p:sld xmlns:a="http://schemas.openxmlformats.org/drawingml/2006/main" xmlns:r="http://schemas.openxmlformats.org/officeDocument/2006/relationships" xmlns:p="http://schemas.openxmlformats.org/presentationml/2006/main">
-  <p:cSld>
-    <p:spTree>
-      <p:nvGrpSpPr>
-        <p:cNvPr id="1" name=""/>
-        <p:cNvGrpSpPr/>
-        <p:nvPr/>
-      </p:nvGrpSpPr>
-      <p:grpSpPr>
-        <a:xfrm>
-          <a:off x="0" y="0"/>
-          <a:ext cx="0" cy="0"/>
-          <a:chOff x="0" y="0"/>
-          <a:chExt cx="0" cy="0"/>
-        </a:xfrm>
-      </p:grpSpPr>
-      <p:sp>
-        <p:nvSpPr>
-          <p:cNvPr id="2" name="Title 1">
-            <a:extLst>
-              <a:ext uri="{FF2B5EF4-FFF2-40B4-BE49-F238E27FC236}">
-                <a16:creationId xmlns:a16="http://schemas.microsoft.com/office/drawing/2014/main" id="{DAD567DC-0B17-4684-B2C7-BFCF2D161FD5}"/>
-              </a:ext>
-            </a:extLst>
-          </p:cNvPr>
-          <p:cNvSpPr>
-            <a:spLocks noGrp="1"/>
-          </p:cNvSpPr>
-          <p:nvPr>
-            <p:ph type="title"/>
-          </p:nvPr>
-        </p:nvSpPr>
-        <p:spPr/>
-        <p:txBody>
-          <a:bodyPr/>
-          <a:lstStyle/>
-          <a:p>
-            <a:r>
-              <a:rPr lang="en-US" dirty="0"/>
-              <a:t>Or… the O/S?</a:t>
-            </a:r>
-          </a:p>
-        </p:txBody>
-      </p:sp>
-      <p:sp>
-        <p:nvSpPr>
-          <p:cNvPr id="3" name="Content Placeholder 2">
-            <a:extLst>
-              <a:ext uri="{FF2B5EF4-FFF2-40B4-BE49-F238E27FC236}">
-                <a16:creationId xmlns:a16="http://schemas.microsoft.com/office/drawing/2014/main" id="{0DCE28FE-5B64-4EC3-AE3F-592FCF134986}"/>
-              </a:ext>
-            </a:extLst>
-          </p:cNvPr>
-          <p:cNvSpPr>
-            <a:spLocks noGrp="1"/>
-          </p:cNvSpPr>
-          <p:nvPr>
-            <p:ph sz="quarter" idx="13"/>
-          </p:nvPr>
-        </p:nvSpPr>
-        <p:spPr>
-          <a:xfrm>
-            <a:off x="609600" y="1828800"/>
-            <a:ext cx="7924800" cy="3886200"/>
-          </a:xfrm>
-        </p:spPr>
-        <p:txBody>
-          <a:bodyPr>
-            <a:normAutofit/>
-          </a:bodyPr>
-          <a:lstStyle/>
-          <a:p>
-            <a:r>
-              <a:rPr lang="en-US" sz="2400" dirty="0"/>
-              <a:t>Key logger?</a:t>
-            </a:r>
-          </a:p>
-          <a:p>
-            <a:r>
-              <a:rPr lang="en-US" sz="2400" dirty="0"/>
-              <a:t>Spyware?</a:t>
-            </a:r>
-          </a:p>
-          <a:p>
-            <a:r>
-              <a:rPr lang="en-US" sz="2400" dirty="0"/>
-              <a:t>Rootkit?</a:t>
-            </a:r>
-          </a:p>
-          <a:p>
-            <a:endParaRPr lang="en-US" sz="2400" dirty="0"/>
-          </a:p>
-          <a:p>
-            <a:r>
-              <a:rPr lang="en-US" sz="2400" dirty="0"/>
-              <a:t>I worked on a spyware case once…</a:t>
-            </a:r>
-          </a:p>
-        </p:txBody>
-      </p:sp>
-    </p:spTree>
-    <p:extLst>
-      <p:ext uri="{BB962C8B-B14F-4D97-AF65-F5344CB8AC3E}">
-        <p14:creationId xmlns:p14="http://schemas.microsoft.com/office/powerpoint/2010/main" val="2757570037"/>
-      </p:ext>
-    </p:extLst>
-  </p:cSld>
-  <p:clrMapOvr>
-    <a:masterClrMapping/>
-  </p:clrMapOvr>
-</p:sld>
-</file>
-
-<file path=ppt/slides/slide29.xml><?xml version="1.0" encoding="utf-8"?>
-<p:sld xmlns:a="http://schemas.openxmlformats.org/drawingml/2006/main" xmlns:r="http://schemas.openxmlformats.org/officeDocument/2006/relationships" xmlns:p="http://schemas.openxmlformats.org/presentationml/2006/main">
-  <p:cSld>
-    <p:spTree>
-      <p:nvGrpSpPr>
-        <p:cNvPr id="1" name=""/>
-        <p:cNvGrpSpPr/>
-        <p:nvPr/>
-      </p:nvGrpSpPr>
-      <p:grpSpPr>
-        <a:xfrm>
-          <a:off x="0" y="0"/>
-          <a:ext cx="0" cy="0"/>
-          <a:chOff x="0" y="0"/>
-          <a:chExt cx="0" cy="0"/>
-        </a:xfrm>
-      </p:grpSpPr>
-      <p:sp>
-        <p:nvSpPr>
-          <p:cNvPr id="2" name="Title 1">
-            <a:extLst>
-              <a:ext uri="{FF2B5EF4-FFF2-40B4-BE49-F238E27FC236}">
-                <a16:creationId xmlns:a16="http://schemas.microsoft.com/office/drawing/2014/main" id="{5308ABFD-DA3F-44E4-A7C1-64C65CE4AAB1}"/>
-              </a:ext>
-            </a:extLst>
-          </p:cNvPr>
-          <p:cNvSpPr>
-            <a:spLocks noGrp="1"/>
-          </p:cNvSpPr>
-          <p:nvPr>
-            <p:ph type="title"/>
-          </p:nvPr>
-        </p:nvSpPr>
-        <p:spPr/>
-        <p:txBody>
-          <a:bodyPr/>
-          <a:lstStyle/>
-          <a:p>
-            <a:r>
-              <a:rPr lang="en-US" dirty="0"/>
-              <a:t>Email Threat: SPAM</a:t>
-            </a:r>
-          </a:p>
-        </p:txBody>
-      </p:sp>
-      <p:sp>
-        <p:nvSpPr>
-          <p:cNvPr id="3" name="Content Placeholder 2">
-            <a:extLst>
-              <a:ext uri="{FF2B5EF4-FFF2-40B4-BE49-F238E27FC236}">
-                <a16:creationId xmlns:a16="http://schemas.microsoft.com/office/drawing/2014/main" id="{9525A384-A3E2-4643-B1A5-FD58EDED291D}"/>
-              </a:ext>
-            </a:extLst>
-          </p:cNvPr>
-          <p:cNvSpPr>
-            <a:spLocks noGrp="1"/>
-          </p:cNvSpPr>
-          <p:nvPr>
-            <p:ph sz="quarter" idx="13"/>
-          </p:nvPr>
-        </p:nvSpPr>
-        <p:spPr>
-          <a:xfrm>
-            <a:off x="609600" y="1676400"/>
-            <a:ext cx="7924800" cy="4038600"/>
-          </a:xfrm>
-        </p:spPr>
-        <p:txBody>
-          <a:bodyPr>
-            <a:normAutofit/>
-          </a:bodyPr>
-          <a:lstStyle/>
-          <a:p>
-            <a:r>
-              <a:rPr lang="en-US" sz="2400" dirty="0"/>
-              <a:t>You know what it is.</a:t>
-            </a:r>
-          </a:p>
-          <a:p>
-            <a:r>
-              <a:rPr lang="en-US" sz="2400" dirty="0"/>
-              <a:t>Why does it work?</a:t>
-            </a:r>
-          </a:p>
-          <a:p>
-            <a:pPr lvl="1"/>
-            <a:r>
-              <a:rPr lang="en-US" sz="2000" dirty="0"/>
-              <a:t>Advertising</a:t>
-            </a:r>
-          </a:p>
-          <a:p>
-            <a:pPr lvl="1"/>
-            <a:r>
-              <a:rPr lang="en-US" sz="2000" dirty="0"/>
-              <a:t>Pump and Dump</a:t>
-            </a:r>
-          </a:p>
-          <a:p>
-            <a:pPr lvl="1"/>
-            <a:r>
-              <a:rPr lang="en-US" sz="2000" dirty="0"/>
-              <a:t>Malicious Payload/Malicious Links</a:t>
-            </a:r>
-          </a:p>
-          <a:p>
-            <a:pPr lvl="1"/>
-            <a:r>
-              <a:rPr lang="en-US" sz="2000" dirty="0"/>
-              <a:t>Unregulated/Illegal Traffic</a:t>
-            </a:r>
-          </a:p>
-        </p:txBody>
-      </p:sp>
-    </p:spTree>
-    <p:extLst>
-      <p:ext uri="{BB962C8B-B14F-4D97-AF65-F5344CB8AC3E}">
-        <p14:creationId xmlns:p14="http://schemas.microsoft.com/office/powerpoint/2010/main" val="1368258247"/>
-      </p:ext>
-    </p:extLst>
-  </p:cSld>
-  <p:clrMapOvr>
-    <a:masterClrMapping/>
-  </p:clrMapOvr>
-</p:sld>
-</file>
-
 <file path=ppt/slides/slide3.xml><?xml version="1.0" encoding="utf-8"?>
 <p:sld xmlns:a="http://schemas.openxmlformats.org/drawingml/2006/main" xmlns:r="http://schemas.openxmlformats.org/officeDocument/2006/relationships" xmlns:p="http://schemas.openxmlformats.org/presentationml/2006/main">
   <p:cSld>
@@ -14216,1078 +13842,6 @@
     <p:extLst>
       <p:ext uri="{BB962C8B-B14F-4D97-AF65-F5344CB8AC3E}">
         <p14:creationId xmlns:p14="http://schemas.microsoft.com/office/powerpoint/2010/main" val="3739445133"/>
-      </p:ext>
-    </p:extLst>
-  </p:cSld>
-  <p:clrMapOvr>
-    <a:masterClrMapping/>
-  </p:clrMapOvr>
-</p:sld>
-</file>
-
-<file path=ppt/slides/slide30.xml><?xml version="1.0" encoding="utf-8"?>
-<p:sld xmlns:a="http://schemas.openxmlformats.org/drawingml/2006/main" xmlns:r="http://schemas.openxmlformats.org/officeDocument/2006/relationships" xmlns:p="http://schemas.openxmlformats.org/presentationml/2006/main">
-  <p:cSld>
-    <p:spTree>
-      <p:nvGrpSpPr>
-        <p:cNvPr id="1" name=""/>
-        <p:cNvGrpSpPr/>
-        <p:nvPr/>
-      </p:nvGrpSpPr>
-      <p:grpSpPr>
-        <a:xfrm>
-          <a:off x="0" y="0"/>
-          <a:ext cx="0" cy="0"/>
-          <a:chOff x="0" y="0"/>
-          <a:chExt cx="0" cy="0"/>
-        </a:xfrm>
-      </p:grpSpPr>
-      <p:sp>
-        <p:nvSpPr>
-          <p:cNvPr id="2" name="Title 1">
-            <a:extLst>
-              <a:ext uri="{FF2B5EF4-FFF2-40B4-BE49-F238E27FC236}">
-                <a16:creationId xmlns:a16="http://schemas.microsoft.com/office/drawing/2014/main" id="{337CB541-297F-4F36-A562-AAFC5470E123}"/>
-              </a:ext>
-            </a:extLst>
-          </p:cNvPr>
-          <p:cNvSpPr>
-            <a:spLocks noGrp="1"/>
-          </p:cNvSpPr>
-          <p:nvPr>
-            <p:ph type="title"/>
-          </p:nvPr>
-        </p:nvSpPr>
-        <p:spPr/>
-        <p:txBody>
-          <a:bodyPr/>
-          <a:lstStyle/>
-          <a:p>
-            <a:r>
-              <a:rPr lang="en-US" dirty="0"/>
-              <a:t>Email Threat: Phishing</a:t>
-            </a:r>
-          </a:p>
-        </p:txBody>
-      </p:sp>
-      <p:pic>
-        <p:nvPicPr>
-          <p:cNvPr id="1026" name="Picture 2" descr="Paypal Phishing Security Notice">
-            <a:extLst>
-              <a:ext uri="{FF2B5EF4-FFF2-40B4-BE49-F238E27FC236}">
-                <a16:creationId xmlns:a16="http://schemas.microsoft.com/office/drawing/2014/main" id="{7596FB76-F4EC-44BA-B431-0E3EB3588F0E}"/>
-              </a:ext>
-            </a:extLst>
-          </p:cNvPr>
-          <p:cNvPicPr>
-            <a:picLocks noChangeAspect="1" noChangeArrowheads="1"/>
-          </p:cNvPicPr>
-          <p:nvPr/>
-        </p:nvPicPr>
-        <p:blipFill>
-          <a:blip r:embed="rId2">
-            <a:extLst>
-              <a:ext uri="{28A0092B-C50C-407E-A947-70E740481C1C}">
-                <a14:useLocalDpi xmlns:a14="http://schemas.microsoft.com/office/drawing/2010/main" val="0"/>
-              </a:ext>
-            </a:extLst>
-          </a:blip>
-          <a:srcRect/>
-          <a:stretch>
-            <a:fillRect/>
-          </a:stretch>
-        </p:blipFill>
-        <p:spPr bwMode="auto">
-          <a:xfrm>
-            <a:off x="1037848" y="1417638"/>
-            <a:ext cx="7068303" cy="5165724"/>
-          </a:xfrm>
-          <a:prstGeom prst="rect">
-            <a:avLst/>
-          </a:prstGeom>
-          <a:noFill/>
-          <a:extLst>
-            <a:ext uri="{909E8E84-426E-40DD-AFC4-6F175D3DCCD1}">
-              <a14:hiddenFill xmlns:a14="http://schemas.microsoft.com/office/drawing/2010/main">
-                <a:solidFill>
-                  <a:srgbClr val="FFFFFF"/>
-                </a:solidFill>
-              </a14:hiddenFill>
-            </a:ext>
-          </a:extLst>
-        </p:spPr>
-      </p:pic>
-    </p:spTree>
-    <p:extLst>
-      <p:ext uri="{BB962C8B-B14F-4D97-AF65-F5344CB8AC3E}">
-        <p14:creationId xmlns:p14="http://schemas.microsoft.com/office/powerpoint/2010/main" val="1896686961"/>
-      </p:ext>
-    </p:extLst>
-  </p:cSld>
-  <p:clrMapOvr>
-    <a:masterClrMapping/>
-  </p:clrMapOvr>
-</p:sld>
-</file>
-
-<file path=ppt/slides/slide31.xml><?xml version="1.0" encoding="utf-8"?>
-<p:sld xmlns:a="http://schemas.openxmlformats.org/drawingml/2006/main" xmlns:r="http://schemas.openxmlformats.org/officeDocument/2006/relationships" xmlns:p="http://schemas.openxmlformats.org/presentationml/2006/main">
-  <p:cSld>
-    <p:spTree>
-      <p:nvGrpSpPr>
-        <p:cNvPr id="1" name=""/>
-        <p:cNvGrpSpPr/>
-        <p:nvPr/>
-      </p:nvGrpSpPr>
-      <p:grpSpPr>
-        <a:xfrm>
-          <a:off x="0" y="0"/>
-          <a:ext cx="0" cy="0"/>
-          <a:chOff x="0" y="0"/>
-          <a:chExt cx="0" cy="0"/>
-        </a:xfrm>
-      </p:grpSpPr>
-      <p:sp>
-        <p:nvSpPr>
-          <p:cNvPr id="2" name="Title 1">
-            <a:extLst>
-              <a:ext uri="{FF2B5EF4-FFF2-40B4-BE49-F238E27FC236}">
-                <a16:creationId xmlns:a16="http://schemas.microsoft.com/office/drawing/2014/main" id="{4321837E-F84E-45FC-B6E8-0B9302E1AB57}"/>
-              </a:ext>
-            </a:extLst>
-          </p:cNvPr>
-          <p:cNvSpPr>
-            <a:spLocks noGrp="1"/>
-          </p:cNvSpPr>
-          <p:nvPr>
-            <p:ph type="title"/>
-          </p:nvPr>
-        </p:nvSpPr>
-        <p:spPr>
-          <a:xfrm>
-            <a:off x="609600" y="152400"/>
-            <a:ext cx="7924800" cy="1143000"/>
-          </a:xfrm>
-        </p:spPr>
-        <p:txBody>
-          <a:bodyPr/>
-          <a:lstStyle/>
-          <a:p>
-            <a:r>
-              <a:rPr lang="en-US" dirty="0"/>
-              <a:t>Phishing Links</a:t>
-            </a:r>
-          </a:p>
-        </p:txBody>
-      </p:sp>
-      <p:pic>
-        <p:nvPicPr>
-          <p:cNvPr id="2050" name="Picture 2">
-            <a:extLst>
-              <a:ext uri="{FF2B5EF4-FFF2-40B4-BE49-F238E27FC236}">
-                <a16:creationId xmlns:a16="http://schemas.microsoft.com/office/drawing/2014/main" id="{B9ABCAE3-330B-46F5-9D51-9509F5426B72}"/>
-              </a:ext>
-            </a:extLst>
-          </p:cNvPr>
-          <p:cNvPicPr>
-            <a:picLocks noChangeAspect="1" noChangeArrowheads="1"/>
-          </p:cNvPicPr>
-          <p:nvPr/>
-        </p:nvPicPr>
-        <p:blipFill>
-          <a:blip r:embed="rId2">
-            <a:extLst>
-              <a:ext uri="{28A0092B-C50C-407E-A947-70E740481C1C}">
-                <a14:useLocalDpi xmlns:a14="http://schemas.microsoft.com/office/drawing/2010/main" val="0"/>
-              </a:ext>
-            </a:extLst>
-          </a:blip>
-          <a:srcRect/>
-          <a:stretch>
-            <a:fillRect/>
-          </a:stretch>
-        </p:blipFill>
-        <p:spPr bwMode="auto">
-          <a:xfrm>
-            <a:off x="-28746" y="3276600"/>
-            <a:ext cx="9144000" cy="2697163"/>
-          </a:xfrm>
-          <a:prstGeom prst="rect">
-            <a:avLst/>
-          </a:prstGeom>
-          <a:noFill/>
-          <a:extLst>
-            <a:ext uri="{909E8E84-426E-40DD-AFC4-6F175D3DCCD1}">
-              <a14:hiddenFill xmlns:a14="http://schemas.microsoft.com/office/drawing/2010/main">
-                <a:solidFill>
-                  <a:srgbClr val="FFFFFF"/>
-                </a:solidFill>
-              </a14:hiddenFill>
-            </a:ext>
-          </a:extLst>
-        </p:spPr>
-      </p:pic>
-      <p:sp>
-        <p:nvSpPr>
-          <p:cNvPr id="4" name="TextBox 3">
-            <a:extLst>
-              <a:ext uri="{FF2B5EF4-FFF2-40B4-BE49-F238E27FC236}">
-                <a16:creationId xmlns:a16="http://schemas.microsoft.com/office/drawing/2014/main" id="{D4073BF9-CE15-4C35-89CE-340205C5CC58}"/>
-              </a:ext>
-            </a:extLst>
-          </p:cNvPr>
-          <p:cNvSpPr txBox="1"/>
-          <p:nvPr/>
-        </p:nvSpPr>
-        <p:spPr>
-          <a:xfrm>
-            <a:off x="4191000" y="2133600"/>
-            <a:ext cx="3350213" cy="400110"/>
-          </a:xfrm>
-          <a:prstGeom prst="rect">
-            <a:avLst/>
-          </a:prstGeom>
-          <a:noFill/>
-        </p:spPr>
-        <p:txBody>
-          <a:bodyPr wrap="none" rtlCol="0">
-            <a:spAutoFit/>
-          </a:bodyPr>
-          <a:lstStyle/>
-          <a:p>
-            <a:r>
-              <a:rPr lang="en-US" sz="2000" dirty="0"/>
-              <a:t>Why do they need a fake URL?</a:t>
-            </a:r>
-          </a:p>
-        </p:txBody>
-      </p:sp>
-      <p:cxnSp>
-        <p:nvCxnSpPr>
-          <p:cNvPr id="6" name="Straight Arrow Connector 5">
-            <a:extLst>
-              <a:ext uri="{FF2B5EF4-FFF2-40B4-BE49-F238E27FC236}">
-                <a16:creationId xmlns:a16="http://schemas.microsoft.com/office/drawing/2014/main" id="{1F894754-857B-42D1-94C9-7A43446890DD}"/>
-              </a:ext>
-            </a:extLst>
-          </p:cNvPr>
-          <p:cNvCxnSpPr>
-            <a:stCxn id="4" idx="2"/>
-          </p:cNvCxnSpPr>
-          <p:nvPr/>
-        </p:nvCxnSpPr>
-        <p:spPr>
-          <a:xfrm flipH="1">
-            <a:off x="1828800" y="2533710"/>
-            <a:ext cx="4037307" cy="1276290"/>
-          </a:xfrm>
-          <a:prstGeom prst="straightConnector1">
-            <a:avLst/>
-          </a:prstGeom>
-          <a:ln>
-            <a:tailEnd type="triangle"/>
-          </a:ln>
-        </p:spPr>
-        <p:style>
-          <a:lnRef idx="3">
-            <a:schemeClr val="dk1"/>
-          </a:lnRef>
-          <a:fillRef idx="0">
-            <a:schemeClr val="dk1"/>
-          </a:fillRef>
-          <a:effectRef idx="2">
-            <a:schemeClr val="dk1"/>
-          </a:effectRef>
-          <a:fontRef idx="minor">
-            <a:schemeClr val="tx1"/>
-          </a:fontRef>
-        </p:style>
-      </p:cxnSp>
-    </p:spTree>
-    <p:extLst>
-      <p:ext uri="{BB962C8B-B14F-4D97-AF65-F5344CB8AC3E}">
-        <p14:creationId xmlns:p14="http://schemas.microsoft.com/office/powerpoint/2010/main" val="18795138"/>
-      </p:ext>
-    </p:extLst>
-  </p:cSld>
-  <p:clrMapOvr>
-    <a:masterClrMapping/>
-  </p:clrMapOvr>
-</p:sld>
-</file>
-
-<file path=ppt/slides/slide32.xml><?xml version="1.0" encoding="utf-8"?>
-<p:sld xmlns:a="http://schemas.openxmlformats.org/drawingml/2006/main" xmlns:r="http://schemas.openxmlformats.org/officeDocument/2006/relationships" xmlns:p="http://schemas.openxmlformats.org/presentationml/2006/main">
-  <p:cSld>
-    <p:spTree>
-      <p:nvGrpSpPr>
-        <p:cNvPr id="1" name=""/>
-        <p:cNvGrpSpPr/>
-        <p:nvPr/>
-      </p:nvGrpSpPr>
-      <p:grpSpPr>
-        <a:xfrm>
-          <a:off x="0" y="0"/>
-          <a:ext cx="0" cy="0"/>
-          <a:chOff x="0" y="0"/>
-          <a:chExt cx="0" cy="0"/>
-        </a:xfrm>
-      </p:grpSpPr>
-      <p:sp>
-        <p:nvSpPr>
-          <p:cNvPr id="2" name="Title 1">
-            <a:extLst>
-              <a:ext uri="{FF2B5EF4-FFF2-40B4-BE49-F238E27FC236}">
-                <a16:creationId xmlns:a16="http://schemas.microsoft.com/office/drawing/2014/main" id="{2B135784-38D4-4139-8DAC-8DFFC50DD8EA}"/>
-              </a:ext>
-            </a:extLst>
-          </p:cNvPr>
-          <p:cNvSpPr>
-            <a:spLocks noGrp="1"/>
-          </p:cNvSpPr>
-          <p:nvPr>
-            <p:ph type="title"/>
-          </p:nvPr>
-        </p:nvSpPr>
-        <p:spPr/>
-        <p:txBody>
-          <a:bodyPr/>
-          <a:lstStyle/>
-          <a:p>
-            <a:r>
-              <a:rPr lang="en-US" dirty="0"/>
-              <a:t>Note About Phishing Training</a:t>
-            </a:r>
-          </a:p>
-        </p:txBody>
-      </p:sp>
-      <p:sp>
-        <p:nvSpPr>
-          <p:cNvPr id="3" name="Content Placeholder 2">
-            <a:extLst>
-              <a:ext uri="{FF2B5EF4-FFF2-40B4-BE49-F238E27FC236}">
-                <a16:creationId xmlns:a16="http://schemas.microsoft.com/office/drawing/2014/main" id="{13221019-37E1-41D2-A2CA-0E3C6A4E532D}"/>
-              </a:ext>
-            </a:extLst>
-          </p:cNvPr>
-          <p:cNvSpPr>
-            <a:spLocks noGrp="1"/>
-          </p:cNvSpPr>
-          <p:nvPr>
-            <p:ph sz="quarter" idx="13"/>
-          </p:nvPr>
-        </p:nvSpPr>
-        <p:spPr>
-          <a:xfrm>
-            <a:off x="609600" y="1828800"/>
-            <a:ext cx="7924800" cy="3886200"/>
-          </a:xfrm>
-        </p:spPr>
-        <p:txBody>
-          <a:bodyPr>
-            <a:normAutofit/>
-          </a:bodyPr>
-          <a:lstStyle/>
-          <a:p>
-            <a:r>
-              <a:rPr lang="en-US" sz="2400" dirty="0"/>
-              <a:t>I’ve yet to see it work.</a:t>
-            </a:r>
-          </a:p>
-          <a:p>
-            <a:r>
-              <a:rPr lang="en-US" sz="2400" dirty="0"/>
-              <a:t>Lots of companies try. Lots of products.</a:t>
-            </a:r>
-          </a:p>
-          <a:p>
-            <a:r>
-              <a:rPr lang="en-US" sz="2400" dirty="0"/>
-              <a:t>Word on the street is the users don’t learn</a:t>
-            </a:r>
-          </a:p>
-        </p:txBody>
-      </p:sp>
-    </p:spTree>
-    <p:extLst>
-      <p:ext uri="{BB962C8B-B14F-4D97-AF65-F5344CB8AC3E}">
-        <p14:creationId xmlns:p14="http://schemas.microsoft.com/office/powerpoint/2010/main" val="4154314873"/>
-      </p:ext>
-    </p:extLst>
-  </p:cSld>
-  <p:clrMapOvr>
-    <a:masterClrMapping/>
-  </p:clrMapOvr>
-</p:sld>
-</file>
-
-<file path=ppt/slides/slide33.xml><?xml version="1.0" encoding="utf-8"?>
-<p:sld xmlns:a="http://schemas.openxmlformats.org/drawingml/2006/main" xmlns:r="http://schemas.openxmlformats.org/officeDocument/2006/relationships" xmlns:p="http://schemas.openxmlformats.org/presentationml/2006/main">
-  <p:cSld>
-    <p:spTree>
-      <p:nvGrpSpPr>
-        <p:cNvPr id="1" name=""/>
-        <p:cNvGrpSpPr/>
-        <p:nvPr/>
-      </p:nvGrpSpPr>
-      <p:grpSpPr>
-        <a:xfrm>
-          <a:off x="0" y="0"/>
-          <a:ext cx="0" cy="0"/>
-          <a:chOff x="0" y="0"/>
-          <a:chExt cx="0" cy="0"/>
-        </a:xfrm>
-      </p:grpSpPr>
-      <p:sp>
-        <p:nvSpPr>
-          <p:cNvPr id="2" name="Title 1">
-            <a:extLst>
-              <a:ext uri="{FF2B5EF4-FFF2-40B4-BE49-F238E27FC236}">
-                <a16:creationId xmlns:a16="http://schemas.microsoft.com/office/drawing/2014/main" id="{0275DCF5-B70F-4577-BB18-050DE5197BC0}"/>
-              </a:ext>
-            </a:extLst>
-          </p:cNvPr>
-          <p:cNvSpPr>
-            <a:spLocks noGrp="1"/>
-          </p:cNvSpPr>
-          <p:nvPr>
-            <p:ph type="title"/>
-          </p:nvPr>
-        </p:nvSpPr>
-        <p:spPr/>
-        <p:txBody>
-          <a:bodyPr/>
-          <a:lstStyle/>
-          <a:p>
-            <a:r>
-              <a:rPr lang="en-US" dirty="0"/>
-              <a:t>Spear Phishing Example 1</a:t>
-            </a:r>
-          </a:p>
-        </p:txBody>
-      </p:sp>
-      <p:pic>
-        <p:nvPicPr>
-          <p:cNvPr id="3074" name="Picture 2" descr="Spear Phishing - Targeting Organisations | FraudWatch International">
-            <a:extLst>
-              <a:ext uri="{FF2B5EF4-FFF2-40B4-BE49-F238E27FC236}">
-                <a16:creationId xmlns:a16="http://schemas.microsoft.com/office/drawing/2014/main" id="{035EFCB1-E5B4-48B6-9FB2-22F0F91BDCB8}"/>
-              </a:ext>
-            </a:extLst>
-          </p:cNvPr>
-          <p:cNvPicPr>
-            <a:picLocks noChangeAspect="1" noChangeArrowheads="1"/>
-          </p:cNvPicPr>
-          <p:nvPr/>
-        </p:nvPicPr>
-        <p:blipFill>
-          <a:blip r:embed="rId2">
-            <a:extLst>
-              <a:ext uri="{28A0092B-C50C-407E-A947-70E740481C1C}">
-                <a14:useLocalDpi xmlns:a14="http://schemas.microsoft.com/office/drawing/2010/main" val="0"/>
-              </a:ext>
-            </a:extLst>
-          </a:blip>
-          <a:srcRect/>
-          <a:stretch>
-            <a:fillRect/>
-          </a:stretch>
-        </p:blipFill>
-        <p:spPr bwMode="auto">
-          <a:xfrm>
-            <a:off x="309563" y="1794989"/>
-            <a:ext cx="8224837" cy="4788373"/>
-          </a:xfrm>
-          <a:prstGeom prst="rect">
-            <a:avLst/>
-          </a:prstGeom>
-          <a:noFill/>
-          <a:extLst>
-            <a:ext uri="{909E8E84-426E-40DD-AFC4-6F175D3DCCD1}">
-              <a14:hiddenFill xmlns:a14="http://schemas.microsoft.com/office/drawing/2010/main">
-                <a:solidFill>
-                  <a:srgbClr val="FFFFFF"/>
-                </a:solidFill>
-              </a14:hiddenFill>
-            </a:ext>
-          </a:extLst>
-        </p:spPr>
-      </p:pic>
-    </p:spTree>
-    <p:extLst>
-      <p:ext uri="{BB962C8B-B14F-4D97-AF65-F5344CB8AC3E}">
-        <p14:creationId xmlns:p14="http://schemas.microsoft.com/office/powerpoint/2010/main" val="2339444336"/>
-      </p:ext>
-    </p:extLst>
-  </p:cSld>
-  <p:clrMapOvr>
-    <a:masterClrMapping/>
-  </p:clrMapOvr>
-</p:sld>
-</file>
-
-<file path=ppt/slides/slide34.xml><?xml version="1.0" encoding="utf-8"?>
-<p:sld xmlns:a="http://schemas.openxmlformats.org/drawingml/2006/main" xmlns:r="http://schemas.openxmlformats.org/officeDocument/2006/relationships" xmlns:p="http://schemas.openxmlformats.org/presentationml/2006/main">
-  <p:cSld>
-    <p:spTree>
-      <p:nvGrpSpPr>
-        <p:cNvPr id="1" name=""/>
-        <p:cNvGrpSpPr/>
-        <p:nvPr/>
-      </p:nvGrpSpPr>
-      <p:grpSpPr>
-        <a:xfrm>
-          <a:off x="0" y="0"/>
-          <a:ext cx="0" cy="0"/>
-          <a:chOff x="0" y="0"/>
-          <a:chExt cx="0" cy="0"/>
-        </a:xfrm>
-      </p:grpSpPr>
-      <p:sp>
-        <p:nvSpPr>
-          <p:cNvPr id="2" name="Title 1">
-            <a:extLst>
-              <a:ext uri="{FF2B5EF4-FFF2-40B4-BE49-F238E27FC236}">
-                <a16:creationId xmlns:a16="http://schemas.microsoft.com/office/drawing/2014/main" id="{E4BA844D-3C49-4266-AD44-222F529F1113}"/>
-              </a:ext>
-            </a:extLst>
-          </p:cNvPr>
-          <p:cNvSpPr>
-            <a:spLocks noGrp="1"/>
-          </p:cNvSpPr>
-          <p:nvPr>
-            <p:ph type="title"/>
-          </p:nvPr>
-        </p:nvSpPr>
-        <p:spPr/>
-        <p:txBody>
-          <a:bodyPr/>
-          <a:lstStyle/>
-          <a:p>
-            <a:r>
-              <a:rPr lang="en-US" dirty="0"/>
-              <a:t>Spear Phishing Example 2</a:t>
-            </a:r>
-          </a:p>
-        </p:txBody>
-      </p:sp>
-      <p:pic>
-        <p:nvPicPr>
-          <p:cNvPr id="4098" name="Picture 2" descr="What is spear phishing? Why targeted email attacks are so difficult to stop  | CSO Online">
-            <a:extLst>
-              <a:ext uri="{FF2B5EF4-FFF2-40B4-BE49-F238E27FC236}">
-                <a16:creationId xmlns:a16="http://schemas.microsoft.com/office/drawing/2014/main" id="{7588200D-2F7F-44DB-B165-C0B8DADC6B6E}"/>
-              </a:ext>
-            </a:extLst>
-          </p:cNvPr>
-          <p:cNvPicPr>
-            <a:picLocks noChangeAspect="1" noChangeArrowheads="1"/>
-          </p:cNvPicPr>
-          <p:nvPr/>
-        </p:nvPicPr>
-        <p:blipFill>
-          <a:blip r:embed="rId2">
-            <a:extLst>
-              <a:ext uri="{28A0092B-C50C-407E-A947-70E740481C1C}">
-                <a14:useLocalDpi xmlns:a14="http://schemas.microsoft.com/office/drawing/2010/main" val="0"/>
-              </a:ext>
-            </a:extLst>
-          </a:blip>
-          <a:srcRect/>
-          <a:stretch>
-            <a:fillRect/>
-          </a:stretch>
-        </p:blipFill>
-        <p:spPr bwMode="auto">
-          <a:xfrm>
-            <a:off x="1143000" y="1417638"/>
-            <a:ext cx="6667500" cy="5267325"/>
-          </a:xfrm>
-          <a:prstGeom prst="rect">
-            <a:avLst/>
-          </a:prstGeom>
-          <a:noFill/>
-          <a:extLst>
-            <a:ext uri="{909E8E84-426E-40DD-AFC4-6F175D3DCCD1}">
-              <a14:hiddenFill xmlns:a14="http://schemas.microsoft.com/office/drawing/2010/main">
-                <a:solidFill>
-                  <a:srgbClr val="FFFFFF"/>
-                </a:solidFill>
-              </a14:hiddenFill>
-            </a:ext>
-          </a:extLst>
-        </p:spPr>
-      </p:pic>
-    </p:spTree>
-    <p:extLst>
-      <p:ext uri="{BB962C8B-B14F-4D97-AF65-F5344CB8AC3E}">
-        <p14:creationId xmlns:p14="http://schemas.microsoft.com/office/powerpoint/2010/main" val="2028115518"/>
-      </p:ext>
-    </p:extLst>
-  </p:cSld>
-  <p:clrMapOvr>
-    <a:masterClrMapping/>
-  </p:clrMapOvr>
-</p:sld>
-</file>
-
-<file path=ppt/slides/slide35.xml><?xml version="1.0" encoding="utf-8"?>
-<p:sld xmlns:a="http://schemas.openxmlformats.org/drawingml/2006/main" xmlns:r="http://schemas.openxmlformats.org/officeDocument/2006/relationships" xmlns:p="http://schemas.openxmlformats.org/presentationml/2006/main">
-  <p:cSld>
-    <p:spTree>
-      <p:nvGrpSpPr>
-        <p:cNvPr id="1" name=""/>
-        <p:cNvGrpSpPr/>
-        <p:nvPr/>
-      </p:nvGrpSpPr>
-      <p:grpSpPr>
-        <a:xfrm>
-          <a:off x="0" y="0"/>
-          <a:ext cx="0" cy="0"/>
-          <a:chOff x="0" y="0"/>
-          <a:chExt cx="0" cy="0"/>
-        </a:xfrm>
-      </p:grpSpPr>
-      <p:sp>
-        <p:nvSpPr>
-          <p:cNvPr id="2" name="Title 1">
-            <a:extLst>
-              <a:ext uri="{FF2B5EF4-FFF2-40B4-BE49-F238E27FC236}">
-                <a16:creationId xmlns:a16="http://schemas.microsoft.com/office/drawing/2014/main" id="{C1186DA3-3E33-454C-AF54-D4CA9F574190}"/>
-              </a:ext>
-            </a:extLst>
-          </p:cNvPr>
-          <p:cNvSpPr>
-            <a:spLocks noGrp="1"/>
-          </p:cNvSpPr>
-          <p:nvPr>
-            <p:ph type="title"/>
-          </p:nvPr>
-        </p:nvSpPr>
-        <p:spPr/>
-        <p:txBody>
-          <a:bodyPr/>
-          <a:lstStyle/>
-          <a:p>
-            <a:r>
-              <a:rPr lang="en-US" dirty="0"/>
-              <a:t>Spear Phishing Details</a:t>
-            </a:r>
-          </a:p>
-        </p:txBody>
-      </p:sp>
-      <p:sp>
-        <p:nvSpPr>
-          <p:cNvPr id="3" name="Content Placeholder 2">
-            <a:extLst>
-              <a:ext uri="{FF2B5EF4-FFF2-40B4-BE49-F238E27FC236}">
-                <a16:creationId xmlns:a16="http://schemas.microsoft.com/office/drawing/2014/main" id="{DBA1E4F0-D905-4399-8E88-857C10028AE6}"/>
-              </a:ext>
-            </a:extLst>
-          </p:cNvPr>
-          <p:cNvSpPr>
-            <a:spLocks noGrp="1"/>
-          </p:cNvSpPr>
-          <p:nvPr>
-            <p:ph sz="quarter" idx="13"/>
-          </p:nvPr>
-        </p:nvSpPr>
-        <p:spPr>
-          <a:xfrm>
-            <a:off x="609600" y="1828800"/>
-            <a:ext cx="7924800" cy="3886200"/>
-          </a:xfrm>
-        </p:spPr>
-        <p:txBody>
-          <a:bodyPr>
-            <a:normAutofit/>
-          </a:bodyPr>
-          <a:lstStyle/>
-          <a:p>
-            <a:r>
-              <a:rPr lang="en-US" sz="2400" dirty="0"/>
-              <a:t>Often requires some recon (trusted email addresses or names)</a:t>
-            </a:r>
-          </a:p>
-          <a:p>
-            <a:r>
-              <a:rPr lang="en-US" sz="2400" dirty="0"/>
-              <a:t>Create fake, </a:t>
-            </a:r>
-            <a:r>
-              <a:rPr lang="en-US" sz="2400" b="1" i="1" dirty="0"/>
-              <a:t>BUT CLOSE</a:t>
-            </a:r>
-            <a:r>
-              <a:rPr lang="en-US" sz="2400" dirty="0"/>
-              <a:t>, email address:</a:t>
-            </a:r>
-          </a:p>
-          <a:p>
-            <a:pPr lvl="1"/>
-            <a:r>
-              <a:rPr lang="en-US" sz="2000" dirty="0"/>
-              <a:t>REAL:  seth.nielson@company.com</a:t>
-            </a:r>
-          </a:p>
-          <a:p>
-            <a:pPr lvl="1"/>
-            <a:r>
-              <a:rPr lang="en-US" sz="2000" dirty="0"/>
-              <a:t>FAKE:  seth.nielson@c0mpany.com</a:t>
-            </a:r>
-          </a:p>
-          <a:p>
-            <a:r>
-              <a:rPr lang="en-US" sz="2400" dirty="0"/>
-              <a:t>Or, just replace DISPLAY NAME:</a:t>
-            </a:r>
-          </a:p>
-          <a:p>
-            <a:pPr lvl="1"/>
-            <a:r>
-              <a:rPr lang="en-US" sz="2000" dirty="0"/>
-              <a:t>REAL: Seth Nielson &lt;seth.nielson@company.com&gt;</a:t>
-            </a:r>
-          </a:p>
-          <a:p>
-            <a:pPr lvl="1"/>
-            <a:r>
-              <a:rPr lang="en-US" sz="2000" dirty="0"/>
-              <a:t>FAKE: Seth Nielson &lt;seth.nielson@not_even_close.com&gt;</a:t>
-            </a:r>
-          </a:p>
-          <a:p>
-            <a:r>
-              <a:rPr lang="en-US" sz="2200" dirty="0"/>
-              <a:t>Target busy people</a:t>
-            </a:r>
-          </a:p>
-        </p:txBody>
-      </p:sp>
-    </p:spTree>
-    <p:extLst>
-      <p:ext uri="{BB962C8B-B14F-4D97-AF65-F5344CB8AC3E}">
-        <p14:creationId xmlns:p14="http://schemas.microsoft.com/office/powerpoint/2010/main" val="2603473359"/>
-      </p:ext>
-    </p:extLst>
-  </p:cSld>
-  <p:clrMapOvr>
-    <a:masterClrMapping/>
-  </p:clrMapOvr>
-</p:sld>
-</file>
-
-<file path=ppt/slides/slide36.xml><?xml version="1.0" encoding="utf-8"?>
-<p:sld xmlns:a="http://schemas.openxmlformats.org/drawingml/2006/main" xmlns:r="http://schemas.openxmlformats.org/officeDocument/2006/relationships" xmlns:p="http://schemas.openxmlformats.org/presentationml/2006/main">
-  <p:cSld>
-    <p:spTree>
-      <p:nvGrpSpPr>
-        <p:cNvPr id="1" name=""/>
-        <p:cNvGrpSpPr/>
-        <p:nvPr/>
-      </p:nvGrpSpPr>
-      <p:grpSpPr>
-        <a:xfrm>
-          <a:off x="0" y="0"/>
-          <a:ext cx="0" cy="0"/>
-          <a:chOff x="0" y="0"/>
-          <a:chExt cx="0" cy="0"/>
-        </a:xfrm>
-      </p:grpSpPr>
-      <p:sp>
-        <p:nvSpPr>
-          <p:cNvPr id="2" name="Title 1">
-            <a:extLst>
-              <a:ext uri="{FF2B5EF4-FFF2-40B4-BE49-F238E27FC236}">
-                <a16:creationId xmlns:a16="http://schemas.microsoft.com/office/drawing/2014/main" id="{C5D16CD8-3CC5-43FB-B2DD-47802DF3520E}"/>
-              </a:ext>
-            </a:extLst>
-          </p:cNvPr>
-          <p:cNvSpPr>
-            <a:spLocks noGrp="1"/>
-          </p:cNvSpPr>
-          <p:nvPr>
-            <p:ph type="title"/>
-          </p:nvPr>
-        </p:nvSpPr>
-        <p:spPr/>
-        <p:txBody>
-          <a:bodyPr/>
-          <a:lstStyle/>
-          <a:p>
-            <a:r>
-              <a:rPr lang="en-US" dirty="0"/>
-              <a:t>Real Estate Scams</a:t>
-            </a:r>
-          </a:p>
-        </p:txBody>
-      </p:sp>
-      <p:pic>
-        <p:nvPicPr>
-          <p:cNvPr id="5122" name="Picture 2" descr="Protect Yourself - Don't Let Wire Fraud Ruin Your Transaction – Redfin  Customer Service">
-            <a:extLst>
-              <a:ext uri="{FF2B5EF4-FFF2-40B4-BE49-F238E27FC236}">
-                <a16:creationId xmlns:a16="http://schemas.microsoft.com/office/drawing/2014/main" id="{F72C7363-6F79-4168-B47A-BA2AFB1104BE}"/>
-              </a:ext>
-            </a:extLst>
-          </p:cNvPr>
-          <p:cNvPicPr>
-            <a:picLocks noChangeAspect="1" noChangeArrowheads="1"/>
-          </p:cNvPicPr>
-          <p:nvPr/>
-        </p:nvPicPr>
-        <p:blipFill>
-          <a:blip r:embed="rId2">
-            <a:extLst>
-              <a:ext uri="{28A0092B-C50C-407E-A947-70E740481C1C}">
-                <a14:useLocalDpi xmlns:a14="http://schemas.microsoft.com/office/drawing/2010/main" val="0"/>
-              </a:ext>
-            </a:extLst>
-          </a:blip>
-          <a:srcRect/>
-          <a:stretch>
-            <a:fillRect/>
-          </a:stretch>
-        </p:blipFill>
-        <p:spPr bwMode="auto">
-          <a:xfrm>
-            <a:off x="228600" y="1828800"/>
-            <a:ext cx="8743950" cy="4524375"/>
-          </a:xfrm>
-          <a:prstGeom prst="rect">
-            <a:avLst/>
-          </a:prstGeom>
-          <a:noFill/>
-          <a:extLst>
-            <a:ext uri="{909E8E84-426E-40DD-AFC4-6F175D3DCCD1}">
-              <a14:hiddenFill xmlns:a14="http://schemas.microsoft.com/office/drawing/2010/main">
-                <a:solidFill>
-                  <a:srgbClr val="FFFFFF"/>
-                </a:solidFill>
-              </a14:hiddenFill>
-            </a:ext>
-          </a:extLst>
-        </p:spPr>
-      </p:pic>
-    </p:spTree>
-    <p:extLst>
-      <p:ext uri="{BB962C8B-B14F-4D97-AF65-F5344CB8AC3E}">
-        <p14:creationId xmlns:p14="http://schemas.microsoft.com/office/powerpoint/2010/main" val="2080474800"/>
-      </p:ext>
-    </p:extLst>
-  </p:cSld>
-  <p:clrMapOvr>
-    <a:masterClrMapping/>
-  </p:clrMapOvr>
-</p:sld>
-</file>
-
-<file path=ppt/slides/slide37.xml><?xml version="1.0" encoding="utf-8"?>
-<p:sld xmlns:a="http://schemas.openxmlformats.org/drawingml/2006/main" xmlns:r="http://schemas.openxmlformats.org/officeDocument/2006/relationships" xmlns:p="http://schemas.openxmlformats.org/presentationml/2006/main">
-  <p:cSld>
-    <p:spTree>
-      <p:nvGrpSpPr>
-        <p:cNvPr id="1" name=""/>
-        <p:cNvGrpSpPr/>
-        <p:nvPr/>
-      </p:nvGrpSpPr>
-      <p:grpSpPr>
-        <a:xfrm>
-          <a:off x="0" y="0"/>
-          <a:ext cx="0" cy="0"/>
-          <a:chOff x="0" y="0"/>
-          <a:chExt cx="0" cy="0"/>
-        </a:xfrm>
-      </p:grpSpPr>
-      <p:sp>
-        <p:nvSpPr>
-          <p:cNvPr id="2" name="Title 1">
-            <a:extLst>
-              <a:ext uri="{FF2B5EF4-FFF2-40B4-BE49-F238E27FC236}">
-                <a16:creationId xmlns:a16="http://schemas.microsoft.com/office/drawing/2014/main" id="{C605382E-2084-4E8F-AEAD-EFF9A5734DFD}"/>
-              </a:ext>
-            </a:extLst>
-          </p:cNvPr>
-          <p:cNvSpPr>
-            <a:spLocks noGrp="1"/>
-          </p:cNvSpPr>
-          <p:nvPr>
-            <p:ph type="title"/>
-          </p:nvPr>
-        </p:nvSpPr>
-        <p:spPr/>
-        <p:txBody>
-          <a:bodyPr/>
-          <a:lstStyle/>
-          <a:p>
-            <a:r>
-              <a:rPr lang="en-US" dirty="0"/>
-              <a:t>Malicious Email and Psychology</a:t>
-            </a:r>
-          </a:p>
-        </p:txBody>
-      </p:sp>
-      <p:sp>
-        <p:nvSpPr>
-          <p:cNvPr id="3" name="Content Placeholder 2">
-            <a:extLst>
-              <a:ext uri="{FF2B5EF4-FFF2-40B4-BE49-F238E27FC236}">
-                <a16:creationId xmlns:a16="http://schemas.microsoft.com/office/drawing/2014/main" id="{02A6A002-184F-4CE4-8F4D-5064B813D76D}"/>
-              </a:ext>
-            </a:extLst>
-          </p:cNvPr>
-          <p:cNvSpPr>
-            <a:spLocks noGrp="1"/>
-          </p:cNvSpPr>
-          <p:nvPr>
-            <p:ph sz="quarter" idx="13"/>
-          </p:nvPr>
-        </p:nvSpPr>
-        <p:spPr>
-          <a:xfrm>
-            <a:off x="609600" y="1828800"/>
-            <a:ext cx="7924800" cy="3886200"/>
-          </a:xfrm>
-        </p:spPr>
-        <p:txBody>
-          <a:bodyPr>
-            <a:normAutofit/>
-          </a:bodyPr>
-          <a:lstStyle/>
-          <a:p>
-            <a:r>
-              <a:rPr lang="en-US" sz="2400" dirty="0"/>
-              <a:t>Psychological Manipulation</a:t>
-            </a:r>
-          </a:p>
-          <a:p>
-            <a:r>
-              <a:rPr lang="en-US" sz="2400" dirty="0"/>
-              <a:t>Similar to Anderson’s example about </a:t>
-            </a:r>
-            <a:r>
-              <a:rPr lang="en-US" sz="2400" i="1" dirty="0"/>
-              <a:t>pretexting</a:t>
-            </a:r>
-            <a:endParaRPr lang="en-US" sz="2400" dirty="0"/>
-          </a:p>
-          <a:p>
-            <a:r>
-              <a:rPr lang="en-US" sz="2400" dirty="0"/>
-              <a:t>Emotional impulses drive the reactions</a:t>
-            </a:r>
-          </a:p>
-          <a:p>
-            <a:r>
-              <a:rPr lang="en-US" sz="2400" b="1" i="1" dirty="0"/>
-              <a:t>WE ARE </a:t>
-            </a:r>
-            <a:r>
-              <a:rPr lang="en-US" sz="2400" b="1" i="1" u="sng" dirty="0"/>
-              <a:t>ALL</a:t>
-            </a:r>
-            <a:r>
-              <a:rPr lang="en-US" sz="2400" b="1" i="1" dirty="0"/>
-              <a:t> VULNERABLE TO THIS</a:t>
-            </a:r>
-          </a:p>
-        </p:txBody>
-      </p:sp>
-    </p:spTree>
-    <p:extLst>
-      <p:ext uri="{BB962C8B-B14F-4D97-AF65-F5344CB8AC3E}">
-        <p14:creationId xmlns:p14="http://schemas.microsoft.com/office/powerpoint/2010/main" val="1445656863"/>
-      </p:ext>
-    </p:extLst>
-  </p:cSld>
-  <p:clrMapOvr>
-    <a:masterClrMapping/>
-  </p:clrMapOvr>
-</p:sld>
-</file>
-
-<file path=ppt/slides/slide38.xml><?xml version="1.0" encoding="utf-8"?>
-<p:sld xmlns:a="http://schemas.openxmlformats.org/drawingml/2006/main" xmlns:r="http://schemas.openxmlformats.org/officeDocument/2006/relationships" xmlns:p="http://schemas.openxmlformats.org/presentationml/2006/main">
-  <p:cSld>
-    <p:spTree>
-      <p:nvGrpSpPr>
-        <p:cNvPr id="1" name=""/>
-        <p:cNvGrpSpPr/>
-        <p:nvPr/>
-      </p:nvGrpSpPr>
-      <p:grpSpPr>
-        <a:xfrm>
-          <a:off x="0" y="0"/>
-          <a:ext cx="0" cy="0"/>
-          <a:chOff x="0" y="0"/>
-          <a:chExt cx="0" cy="0"/>
-        </a:xfrm>
-      </p:grpSpPr>
-      <p:sp>
-        <p:nvSpPr>
-          <p:cNvPr id="2" name="Title 1">
-            <a:extLst>
-              <a:ext uri="{FF2B5EF4-FFF2-40B4-BE49-F238E27FC236}">
-                <a16:creationId xmlns:a16="http://schemas.microsoft.com/office/drawing/2014/main" id="{05F12183-29CD-41E0-AA7F-579DF57C01DB}"/>
-              </a:ext>
-            </a:extLst>
-          </p:cNvPr>
-          <p:cNvSpPr>
-            <a:spLocks noGrp="1"/>
-          </p:cNvSpPr>
-          <p:nvPr>
-            <p:ph type="title"/>
-          </p:nvPr>
-        </p:nvSpPr>
-        <p:spPr/>
-        <p:txBody>
-          <a:bodyPr>
-            <a:normAutofit fontScale="90000"/>
-          </a:bodyPr>
-          <a:lstStyle/>
-          <a:p>
-            <a:r>
-              <a:rPr lang="en-US" dirty="0"/>
-              <a:t>Phishing Competition Submission</a:t>
-            </a:r>
-          </a:p>
-        </p:txBody>
-      </p:sp>
-      <p:pic>
-        <p:nvPicPr>
-          <p:cNvPr id="5" name="Picture 4">
-            <a:extLst>
-              <a:ext uri="{FF2B5EF4-FFF2-40B4-BE49-F238E27FC236}">
-                <a16:creationId xmlns:a16="http://schemas.microsoft.com/office/drawing/2014/main" id="{4805DB08-C323-4748-8C8A-8B11F4CC963D}"/>
-              </a:ext>
-            </a:extLst>
-          </p:cNvPr>
-          <p:cNvPicPr>
-            <a:picLocks noChangeAspect="1"/>
-          </p:cNvPicPr>
-          <p:nvPr/>
-        </p:nvPicPr>
-        <p:blipFill>
-          <a:blip r:embed="rId2"/>
-          <a:stretch>
-            <a:fillRect/>
-          </a:stretch>
-        </p:blipFill>
-        <p:spPr>
-          <a:xfrm>
-            <a:off x="1752600" y="1447950"/>
-            <a:ext cx="5171393" cy="5305075"/>
-          </a:xfrm>
-          <a:prstGeom prst="rect">
-            <a:avLst/>
-          </a:prstGeom>
-        </p:spPr>
-      </p:pic>
-    </p:spTree>
-    <p:extLst>
-      <p:ext uri="{BB962C8B-B14F-4D97-AF65-F5344CB8AC3E}">
-        <p14:creationId xmlns:p14="http://schemas.microsoft.com/office/powerpoint/2010/main" val="3426666725"/>
       </p:ext>
     </p:extLst>
   </p:cSld>

</xml_diff>